<commit_message>
Add minor slide tweaks
</commit_message>
<xml_diff>
--- a/cits1003-lecture_slides/CITS1003-A Cyber Law.pptx
+++ b/cits1003-lecture_slides/CITS1003-A Cyber Law.pptx
@@ -161,6 +161,35 @@
     </p:extLst>
   </p:cmAuthor>
 </p:cmAuthorLst>
+</file>
+
+<file path=ppt/changesInfos/changesInfo1.xml><?xml version="1.0" encoding="utf-8"?>
+<pc:chgInfo xmlns:a="http://schemas.openxmlformats.org/drawingml/2006/main" xmlns:r="http://schemas.openxmlformats.org/officeDocument/2006/relationships" xmlns:ac="http://schemas.microsoft.com/office/drawing/2013/main/command" xmlns:pc="http://schemas.microsoft.com/office/powerpoint/2013/main/command">
+  <pc:docChgLst>
+    <pc:chgData name="Robert McKnight" userId="d5c7fb24-67df-49c0-a0e8-7fe946ae099c" providerId="ADAL" clId="{02734D5B-E254-4AE2-B983-CBADBA8152C3}"/>
+    <pc:docChg chg="modSld">
+      <pc:chgData name="Robert McKnight" userId="d5c7fb24-67df-49c0-a0e8-7fe946ae099c" providerId="ADAL" clId="{02734D5B-E254-4AE2-B983-CBADBA8152C3}" dt="2023-09-06T06:03:28.468" v="1" actId="20577"/>
+      <pc:docMkLst>
+        <pc:docMk/>
+      </pc:docMkLst>
+      <pc:sldChg chg="modSp mod">
+        <pc:chgData name="Robert McKnight" userId="d5c7fb24-67df-49c0-a0e8-7fe946ae099c" providerId="ADAL" clId="{02734D5B-E254-4AE2-B983-CBADBA8152C3}" dt="2023-09-06T06:03:28.468" v="1" actId="20577"/>
+        <pc:sldMkLst>
+          <pc:docMk/>
+          <pc:sldMk cId="1077586671" sldId="256"/>
+        </pc:sldMkLst>
+        <pc:spChg chg="mod">
+          <ac:chgData name="Robert McKnight" userId="d5c7fb24-67df-49c0-a0e8-7fe946ae099c" providerId="ADAL" clId="{02734D5B-E254-4AE2-B983-CBADBA8152C3}" dt="2023-09-06T06:03:28.468" v="1" actId="20577"/>
+          <ac:spMkLst>
+            <pc:docMk/>
+            <pc:sldMk cId="1077586671" sldId="256"/>
+            <ac:spMk id="2" creationId="{A7F2B5DE-6445-CC49-9F8E-7C9072991AF6}"/>
+          </ac:spMkLst>
+        </pc:spChg>
+      </pc:sldChg>
+    </pc:docChg>
+  </pc:docChgLst>
+</pc:chgInfo>
 </file>
 
 <file path=ppt/diagrams/colors1.xml><?xml version="1.0" encoding="utf-8"?>
@@ -3403,7 +3432,7 @@
           <a:p>
             <a:fld id="{6D6D7260-B7E4-B548-BD1F-84ED14536037}" type="datetimeFigureOut">
               <a:rPr lang="en-AU" smtClean="0"/>
-              <a:t>11/5/21</a:t>
+              <a:t>6/09/2023</a:t>
             </a:fld>
             <a:endParaRPr lang="en-AU"/>
           </a:p>
@@ -3921,7 +3950,7 @@
           <a:p>
             <a:fld id="{88D38747-4367-4BD2-8D51-C97E202738E2}" type="datetime1">
               <a:rPr lang="en-US" smtClean="0"/>
-              <a:t>5/11/21</a:t>
+              <a:t>9/6/2023</a:t>
             </a:fld>
             <a:endParaRPr lang="en-US" dirty="0"/>
           </a:p>
@@ -4226,7 +4255,7 @@
           <a:p>
             <a:fld id="{11F1B079-7EF0-44EE-B798-BCC497C9F3B2}" type="datetime1">
               <a:rPr lang="en-US" smtClean="0"/>
-              <a:t>5/11/21</a:t>
+              <a:t>9/6/2023</a:t>
             </a:fld>
             <a:endParaRPr lang="en-US" dirty="0"/>
           </a:p>
@@ -4420,7 +4449,7 @@
           <a:p>
             <a:fld id="{28FF70A8-1D13-4657-95F0-A9EA54967B8D}" type="datetime1">
               <a:rPr lang="en-US" smtClean="0"/>
-              <a:t>5/11/21</a:t>
+              <a:t>9/6/2023</a:t>
             </a:fld>
             <a:endParaRPr lang="en-US" dirty="0"/>
           </a:p>
@@ -4683,7 +4712,7 @@
           <a:p>
             <a:fld id="{21EB90AC-71BD-4C7F-8ACA-7B3F18292E63}" type="datetime1">
               <a:rPr lang="en-US" smtClean="0"/>
-              <a:t>5/11/21</a:t>
+              <a:t>9/6/2023</a:t>
             </a:fld>
             <a:endParaRPr lang="en-US" dirty="0"/>
           </a:p>
@@ -5119,7 +5148,7 @@
           <a:p>
             <a:fld id="{4E6EFC2C-8905-46F0-B443-CE905B76BA01}" type="datetime1">
               <a:rPr lang="en-US" smtClean="0"/>
-              <a:t>5/11/21</a:t>
+              <a:t>9/6/2023</a:t>
             </a:fld>
             <a:endParaRPr lang="en-US" dirty="0"/>
           </a:p>
@@ -5656,7 +5685,7 @@
           <a:p>
             <a:fld id="{D9079DC3-C9B5-499E-9140-0DC28B7074E2}" type="datetime1">
               <a:rPr lang="en-US" smtClean="0"/>
-              <a:t>5/11/21</a:t>
+              <a:t>9/6/2023</a:t>
             </a:fld>
             <a:endParaRPr lang="en-US" dirty="0"/>
           </a:p>
@@ -6538,7 +6567,7 @@
           <a:p>
             <a:fld id="{30BB33EA-E472-4D22-9C03-A9C14AA21CED}" type="datetime1">
               <a:rPr lang="en-US" smtClean="0"/>
-              <a:t>5/11/21</a:t>
+              <a:t>9/6/2023</a:t>
             </a:fld>
             <a:endParaRPr lang="en-US" dirty="0"/>
           </a:p>
@@ -6708,7 +6737,7 @@
           <a:p>
             <a:fld id="{217E833E-1B6D-415F-AD29-75AE8C43BD0D}" type="datetime1">
               <a:rPr lang="en-US" smtClean="0"/>
-              <a:t>5/11/21</a:t>
+              <a:t>9/6/2023</a:t>
             </a:fld>
             <a:endParaRPr lang="en-US" dirty="0"/>
           </a:p>
@@ -6892,7 +6921,7 @@
           <a:p>
             <a:fld id="{8452596F-08A7-4B70-989A-F2B1CF31E66B}" type="datetime1">
               <a:rPr lang="en-US" smtClean="0"/>
-              <a:t>5/11/21</a:t>
+              <a:t>9/6/2023</a:t>
             </a:fld>
             <a:endParaRPr lang="en-US" dirty="0"/>
           </a:p>
@@ -7062,7 +7091,7 @@
           <a:p>
             <a:fld id="{73C55A3C-5767-4844-A0A3-83778C2E5409}" type="datetime1">
               <a:rPr lang="en-US" smtClean="0"/>
-              <a:t>5/11/21</a:t>
+              <a:t>9/6/2023</a:t>
             </a:fld>
             <a:endParaRPr lang="en-US" dirty="0"/>
           </a:p>
@@ -7306,7 +7335,7 @@
           <a:p>
             <a:fld id="{CAE507A8-A5CF-4D38-AB86-7EDDA87A85D4}" type="datetime1">
               <a:rPr lang="en-US" smtClean="0"/>
-              <a:t>5/11/21</a:t>
+              <a:t>9/6/2023</a:t>
             </a:fld>
             <a:endParaRPr lang="en-US" dirty="0"/>
           </a:p>
@@ -7548,7 +7577,7 @@
           <a:p>
             <a:fld id="{BDFCD27C-8599-43EF-BA1D-14DDC1946E06}" type="datetime1">
               <a:rPr lang="en-US" smtClean="0"/>
-              <a:t>5/11/21</a:t>
+              <a:t>9/6/2023</a:t>
             </a:fld>
             <a:endParaRPr lang="en-US" dirty="0"/>
           </a:p>
@@ -8029,7 +8058,7 @@
           <a:p>
             <a:fld id="{49343D99-809A-49C0-96E5-4250D0B498EE}" type="datetime1">
               <a:rPr lang="en-US" smtClean="0"/>
-              <a:t>5/11/21</a:t>
+              <a:t>9/6/2023</a:t>
             </a:fld>
             <a:endParaRPr lang="en-US" dirty="0"/>
           </a:p>
@@ -8147,7 +8176,7 @@
           <a:p>
             <a:fld id="{A143DE9B-B678-4EFB-BB7D-A4370204A0B0}" type="datetime1">
               <a:rPr lang="en-US" smtClean="0"/>
-              <a:t>5/11/21</a:t>
+              <a:t>9/6/2023</a:t>
             </a:fld>
             <a:endParaRPr lang="en-US" dirty="0"/>
           </a:p>
@@ -8242,7 +8271,7 @@
           <a:p>
             <a:fld id="{E68812DA-F765-4142-A6A3-A8ED7235E082}" type="datetime1">
               <a:rPr lang="en-US" smtClean="0"/>
-              <a:t>5/11/21</a:t>
+              <a:t>9/6/2023</a:t>
             </a:fld>
             <a:endParaRPr lang="en-US" dirty="0"/>
           </a:p>
@@ -8497,7 +8526,7 @@
           <a:p>
             <a:fld id="{3E0277FD-7DE6-41D4-930D-AC99F5AFE54E}" type="datetime1">
               <a:rPr lang="en-US" smtClean="0"/>
-              <a:t>5/11/21</a:t>
+              <a:t>9/6/2023</a:t>
             </a:fld>
             <a:endParaRPr lang="en-US" dirty="0"/>
           </a:p>
@@ -8804,7 +8833,7 @@
           <a:p>
             <a:fld id="{9EA15526-7079-4B7B-987C-1B5FAE11A0FF}" type="datetime1">
               <a:rPr lang="en-US" smtClean="0"/>
-              <a:t>5/11/21</a:t>
+              <a:t>9/6/2023</a:t>
             </a:fld>
             <a:endParaRPr lang="en-US" dirty="0"/>
           </a:p>
@@ -9039,7 +9068,7 @@
           <a:p>
             <a:fld id="{073ED0CC-082F-4160-86E5-0D6041F12778}" type="datetime1">
               <a:rPr lang="en-US" smtClean="0"/>
-              <a:t>5/11/21</a:t>
+              <a:t>9/6/2023</a:t>
             </a:fld>
             <a:endParaRPr lang="en-US" dirty="0"/>
           </a:p>
@@ -9950,7 +9979,7 @@
           </a:effectLst>
           <a:extLst>
             <a:ext uri="{91240B29-F687-4f45-9708-019B960494DF}">
-              <a14:hiddenLine xmlns="" xmlns:a14="http://schemas.microsoft.com/office/drawing/2010/main" xmlns:p14="http://schemas.microsoft.com/office/powerpoint/2010/main" xmlns:a16="http://schemas.microsoft.com/office/drawing/2014/main" w="9525">
+              <a14:hiddenLine xmlns:a16="http://schemas.microsoft.com/office/drawing/2014/main" xmlns:p14="http://schemas.microsoft.com/office/powerpoint/2010/main" xmlns:a14="http://schemas.microsoft.com/office/drawing/2010/main" xmlns="" w="9525">
                 <a:solidFill>
                   <a:srgbClr val="000000"/>
                 </a:solidFill>
@@ -10009,8 +10038,12 @@
               <a:rPr lang="en-US" sz="4800" dirty="0"/>
             </a:br>
             <a:r>
+              <a:rPr lang="en-US" sz="4800"/>
+              <a:t>[11] </a:t>
+            </a:r>
+            <a:r>
               <a:rPr lang="en-US" sz="4800" dirty="0"/>
-              <a:t>[10] Cyber Law</a:t>
+              <a:t>Cyber Law</a:t>
             </a:r>
           </a:p>
         </p:txBody>
@@ -10348,7 +10381,7 @@
           </a:effectLst>
           <a:extLst>
             <a:ext uri="{91240B29-F687-4f45-9708-019B960494DF}">
-              <a14:hiddenLine xmlns="" xmlns:a14="http://schemas.microsoft.com/office/drawing/2010/main" xmlns:p14="http://schemas.microsoft.com/office/powerpoint/2010/main" xmlns:a16="http://schemas.microsoft.com/office/drawing/2014/main" w="9525">
+              <a14:hiddenLine xmlns:a16="http://schemas.microsoft.com/office/drawing/2014/main" xmlns:p14="http://schemas.microsoft.com/office/powerpoint/2010/main" xmlns:a14="http://schemas.microsoft.com/office/drawing/2010/main" xmlns="" w="9525">
                 <a:solidFill>
                   <a:srgbClr val="000000"/>
                 </a:solidFill>
@@ -10764,7 +10797,7 @@
           </a:xfrm>
           <a:extLst>
             <a:ext uri="{909E8E84-426E-40dd-AFC4-6F175D3DCCD1}">
-              <a14:hiddenFill xmlns="" xmlns:a14="http://schemas.microsoft.com/office/drawing/2010/main">
+              <a14:hiddenFill xmlns:a14="http://schemas.microsoft.com/office/drawing/2010/main" xmlns="">
                 <a:solidFill>
                   <a:schemeClr val="bg1"/>
                 </a:solidFill>
@@ -10831,7 +10864,7 @@
             </a:ln>
             <a:extLst>
               <a:ext uri="{91240B29-F687-4f45-9708-019B960494DF}">
-                <a14:hiddenLine xmlns="" xmlns:a14="http://schemas.microsoft.com/office/drawing/2010/main" w="9525">
+                <a14:hiddenLine xmlns:a14="http://schemas.microsoft.com/office/drawing/2010/main" xmlns="" w="9525">
                   <a:solidFill>
                     <a:srgbClr val="C0C0C0"/>
                   </a:solidFill>
@@ -10992,7 +11025,7 @@
             </a:ln>
             <a:extLst>
               <a:ext uri="{909E8E84-426E-40dd-AFC4-6F175D3DCCD1}">
-                <a14:hiddenFill xmlns="" xmlns:a14="http://schemas.microsoft.com/office/drawing/2010/main">
+                <a14:hiddenFill xmlns:a14="http://schemas.microsoft.com/office/drawing/2010/main" xmlns="">
                   <a:noFill/>
                 </a14:hiddenFill>
               </a:ext>
@@ -11037,12 +11070,12 @@
             <a:effectLst/>
             <a:extLst>
               <a:ext uri="{909E8E84-426E-40dd-AFC4-6F175D3DCCD1}">
-                <a14:hiddenFill xmlns="" xmlns:a14="http://schemas.microsoft.com/office/drawing/2010/main">
+                <a14:hiddenFill xmlns:a14="http://schemas.microsoft.com/office/drawing/2010/main" xmlns="">
                   <a:noFill/>
                 </a14:hiddenFill>
               </a:ext>
               <a:ext uri="{AF507438-7753-43e0-B8FC-AC1667EBCBE1}">
-                <a14:hiddenEffects xmlns="" xmlns:a14="http://schemas.microsoft.com/office/drawing/2010/main">
+                <a14:hiddenEffects xmlns:a14="http://schemas.microsoft.com/office/drawing/2010/main" xmlns="">
                   <a:effectLst>
                     <a:outerShdw blurRad="63500" dist="38099" dir="2700000" algn="ctr" rotWithShape="0">
                       <a:srgbClr val="000000">
@@ -11087,7 +11120,7 @@
             <a:effectLst/>
             <a:extLst>
               <a:ext uri="{91240B29-F687-4f45-9708-019B960494DF}">
-                <a14:hiddenLine xmlns="" xmlns:a14="http://schemas.microsoft.com/office/drawing/2010/main" w="9525">
+                <a14:hiddenLine xmlns:a14="http://schemas.microsoft.com/office/drawing/2010/main" xmlns="" w="9525">
                   <a:solidFill>
                     <a:srgbClr val="C0C0C0"/>
                   </a:solidFill>
@@ -11097,7 +11130,7 @@
                 </a14:hiddenLine>
               </a:ext>
               <a:ext uri="{AF507438-7753-43e0-B8FC-AC1667EBCBE1}">
-                <a14:hiddenEffects xmlns="" xmlns:a14="http://schemas.microsoft.com/office/drawing/2010/main">
+                <a14:hiddenEffects xmlns:a14="http://schemas.microsoft.com/office/drawing/2010/main" xmlns="">
                   <a:effectLst>
                     <a:outerShdw blurRad="63500" dist="38099" dir="2700000" algn="ctr" rotWithShape="0">
                       <a:srgbClr val="000000">
@@ -11251,7 +11284,7 @@
             <a:effectLst/>
             <a:extLst>
               <a:ext uri="{91240B29-F687-4f45-9708-019B960494DF}">
-                <a14:hiddenLine xmlns="" xmlns:a14="http://schemas.microsoft.com/office/drawing/2010/main" w="9525">
+                <a14:hiddenLine xmlns:a14="http://schemas.microsoft.com/office/drawing/2010/main" xmlns="" w="9525">
                   <a:solidFill>
                     <a:srgbClr val="C0C0C0"/>
                   </a:solidFill>
@@ -11261,7 +11294,7 @@
                 </a14:hiddenLine>
               </a:ext>
               <a:ext uri="{AF507438-7753-43e0-B8FC-AC1667EBCBE1}">
-                <a14:hiddenEffects xmlns="" xmlns:a14="http://schemas.microsoft.com/office/drawing/2010/main">
+                <a14:hiddenEffects xmlns:a14="http://schemas.microsoft.com/office/drawing/2010/main" xmlns="">
                   <a:effectLst>
                     <a:outerShdw blurRad="63500" dist="38099" dir="2700000" algn="ctr" rotWithShape="0">
                       <a:srgbClr val="000000">
@@ -11427,7 +11460,7 @@
             <a:effectLst/>
             <a:extLst>
               <a:ext uri="{91240B29-F687-4f45-9708-019B960494DF}">
-                <a14:hiddenLine xmlns="" xmlns:a14="http://schemas.microsoft.com/office/drawing/2010/main" w="9525">
+                <a14:hiddenLine xmlns:a14="http://schemas.microsoft.com/office/drawing/2010/main" xmlns="" w="9525">
                   <a:solidFill>
                     <a:srgbClr val="C0C0C0"/>
                   </a:solidFill>
@@ -11437,7 +11470,7 @@
                 </a14:hiddenLine>
               </a:ext>
               <a:ext uri="{AF507438-7753-43e0-B8FC-AC1667EBCBE1}">
-                <a14:hiddenEffects xmlns="" xmlns:a14="http://schemas.microsoft.com/office/drawing/2010/main">
+                <a14:hiddenEffects xmlns:a14="http://schemas.microsoft.com/office/drawing/2010/main" xmlns="">
                   <a:effectLst>
                     <a:outerShdw blurRad="63500" dist="38099" dir="2700000" algn="ctr" rotWithShape="0">
                       <a:srgbClr val="000000">
@@ -11594,7 +11627,7 @@
             <a:effectLst/>
             <a:extLst>
               <a:ext uri="{91240B29-F687-4f45-9708-019B960494DF}">
-                <a14:hiddenLine xmlns="" xmlns:a14="http://schemas.microsoft.com/office/drawing/2010/main" w="9525">
+                <a14:hiddenLine xmlns:a14="http://schemas.microsoft.com/office/drawing/2010/main" xmlns="" w="9525">
                   <a:solidFill>
                     <a:srgbClr val="C0C0C0"/>
                   </a:solidFill>
@@ -11604,7 +11637,7 @@
                 </a14:hiddenLine>
               </a:ext>
               <a:ext uri="{AF507438-7753-43e0-B8FC-AC1667EBCBE1}">
-                <a14:hiddenEffects xmlns="" xmlns:a14="http://schemas.microsoft.com/office/drawing/2010/main">
+                <a14:hiddenEffects xmlns:a14="http://schemas.microsoft.com/office/drawing/2010/main" xmlns="">
                   <a:effectLst>
                     <a:outerShdw blurRad="63500" dist="38099" dir="2700000" algn="ctr" rotWithShape="0">
                       <a:srgbClr val="000000">
@@ -11761,7 +11794,7 @@
             <a:effectLst/>
             <a:extLst>
               <a:ext uri="{91240B29-F687-4f45-9708-019B960494DF}">
-                <a14:hiddenLine xmlns="" xmlns:a14="http://schemas.microsoft.com/office/drawing/2010/main" w="9525">
+                <a14:hiddenLine xmlns:a14="http://schemas.microsoft.com/office/drawing/2010/main" xmlns="" w="9525">
                   <a:solidFill>
                     <a:srgbClr val="C0C0C0"/>
                   </a:solidFill>
@@ -11771,7 +11804,7 @@
                 </a14:hiddenLine>
               </a:ext>
               <a:ext uri="{AF507438-7753-43e0-B8FC-AC1667EBCBE1}">
-                <a14:hiddenEffects xmlns="" xmlns:a14="http://schemas.microsoft.com/office/drawing/2010/main">
+                <a14:hiddenEffects xmlns:a14="http://schemas.microsoft.com/office/drawing/2010/main" xmlns="">
                   <a:effectLst>
                     <a:outerShdw blurRad="63500" dist="38099" dir="2700000" algn="ctr" rotWithShape="0">
                       <a:srgbClr val="000000">
@@ -11982,12 +12015,12 @@
             <a:effectLst/>
             <a:extLst>
               <a:ext uri="{909E8E84-426E-40dd-AFC4-6F175D3DCCD1}">
-                <a14:hiddenFill xmlns="" xmlns:a14="http://schemas.microsoft.com/office/drawing/2010/main">
+                <a14:hiddenFill xmlns:a14="http://schemas.microsoft.com/office/drawing/2010/main" xmlns="">
                   <a:noFill/>
                 </a14:hiddenFill>
               </a:ext>
               <a:ext uri="{AF507438-7753-43e0-B8FC-AC1667EBCBE1}">
-                <a14:hiddenEffects xmlns="" xmlns:a14="http://schemas.microsoft.com/office/drawing/2010/main">
+                <a14:hiddenEffects xmlns:a14="http://schemas.microsoft.com/office/drawing/2010/main" xmlns="">
                   <a:effectLst>
                     <a:outerShdw blurRad="63500" dist="38099" dir="2700000" algn="ctr" rotWithShape="0">
                       <a:srgbClr val="000000">
@@ -12038,12 +12071,12 @@
             <a:effectLst/>
             <a:extLst>
               <a:ext uri="{909E8E84-426E-40dd-AFC4-6F175D3DCCD1}">
-                <a14:hiddenFill xmlns="" xmlns:a14="http://schemas.microsoft.com/office/drawing/2010/main">
+                <a14:hiddenFill xmlns:a14="http://schemas.microsoft.com/office/drawing/2010/main" xmlns="">
                   <a:noFill/>
                 </a14:hiddenFill>
               </a:ext>
               <a:ext uri="{AF507438-7753-43e0-B8FC-AC1667EBCBE1}">
-                <a14:hiddenEffects xmlns="" xmlns:a14="http://schemas.microsoft.com/office/drawing/2010/main">
+                <a14:hiddenEffects xmlns:a14="http://schemas.microsoft.com/office/drawing/2010/main" xmlns="">
                   <a:effectLst>
                     <a:outerShdw blurRad="63500" dist="38099" dir="2700000" algn="ctr" rotWithShape="0">
                       <a:srgbClr val="000000">
@@ -12094,12 +12127,12 @@
             <a:effectLst/>
             <a:extLst>
               <a:ext uri="{909E8E84-426E-40dd-AFC4-6F175D3DCCD1}">
-                <a14:hiddenFill xmlns="" xmlns:a14="http://schemas.microsoft.com/office/drawing/2010/main">
+                <a14:hiddenFill xmlns:a14="http://schemas.microsoft.com/office/drawing/2010/main" xmlns="">
                   <a:noFill/>
                 </a14:hiddenFill>
               </a:ext>
               <a:ext uri="{AF507438-7753-43e0-B8FC-AC1667EBCBE1}">
-                <a14:hiddenEffects xmlns="" xmlns:a14="http://schemas.microsoft.com/office/drawing/2010/main">
+                <a14:hiddenEffects xmlns:a14="http://schemas.microsoft.com/office/drawing/2010/main" xmlns="">
                   <a:effectLst>
                     <a:outerShdw blurRad="63500" dist="38099" dir="2700000" algn="ctr" rotWithShape="0">
                       <a:srgbClr val="000000">
@@ -12150,12 +12183,12 @@
             <a:effectLst/>
             <a:extLst>
               <a:ext uri="{909E8E84-426E-40dd-AFC4-6F175D3DCCD1}">
-                <a14:hiddenFill xmlns="" xmlns:a14="http://schemas.microsoft.com/office/drawing/2010/main">
+                <a14:hiddenFill xmlns:a14="http://schemas.microsoft.com/office/drawing/2010/main" xmlns="">
                   <a:noFill/>
                 </a14:hiddenFill>
               </a:ext>
               <a:ext uri="{AF507438-7753-43e0-B8FC-AC1667EBCBE1}">
-                <a14:hiddenEffects xmlns="" xmlns:a14="http://schemas.microsoft.com/office/drawing/2010/main">
+                <a14:hiddenEffects xmlns:a14="http://schemas.microsoft.com/office/drawing/2010/main" xmlns="">
                   <a:effectLst>
                     <a:outerShdw blurRad="63500" dist="38099" dir="2700000" algn="ctr" rotWithShape="0">
                       <a:srgbClr val="000000">
@@ -12206,12 +12239,12 @@
             <a:effectLst/>
             <a:extLst>
               <a:ext uri="{909E8E84-426E-40dd-AFC4-6F175D3DCCD1}">
-                <a14:hiddenFill xmlns="" xmlns:a14="http://schemas.microsoft.com/office/drawing/2010/main">
+                <a14:hiddenFill xmlns:a14="http://schemas.microsoft.com/office/drawing/2010/main" xmlns="">
                   <a:noFill/>
                 </a14:hiddenFill>
               </a:ext>
               <a:ext uri="{AF507438-7753-43e0-B8FC-AC1667EBCBE1}">
-                <a14:hiddenEffects xmlns="" xmlns:a14="http://schemas.microsoft.com/office/drawing/2010/main">
+                <a14:hiddenEffects xmlns:a14="http://schemas.microsoft.com/office/drawing/2010/main" xmlns="">
                   <a:effectLst>
                     <a:outerShdw blurRad="63500" dist="38099" dir="2700000" algn="ctr" rotWithShape="0">
                       <a:srgbClr val="000000">
@@ -12256,7 +12289,7 @@
             <a:effectLst/>
             <a:extLst>
               <a:ext uri="{91240B29-F687-4f45-9708-019B960494DF}">
-                <a14:hiddenLine xmlns="" xmlns:a14="http://schemas.microsoft.com/office/drawing/2010/main" w="9525">
+                <a14:hiddenLine xmlns:a14="http://schemas.microsoft.com/office/drawing/2010/main" xmlns="" w="9525">
                   <a:solidFill>
                     <a:srgbClr val="C0C0C0"/>
                   </a:solidFill>
@@ -12266,7 +12299,7 @@
                 </a14:hiddenLine>
               </a:ext>
               <a:ext uri="{AF507438-7753-43e0-B8FC-AC1667EBCBE1}">
-                <a14:hiddenEffects xmlns="" xmlns:a14="http://schemas.microsoft.com/office/drawing/2010/main">
+                <a14:hiddenEffects xmlns:a14="http://schemas.microsoft.com/office/drawing/2010/main" xmlns="">
                   <a:effectLst>
                     <a:outerShdw blurRad="63500" dist="38099" dir="2700000" algn="ctr" rotWithShape="0">
                       <a:srgbClr val="000000">
@@ -12438,12 +12471,12 @@
             <a:effectLst/>
             <a:extLst>
               <a:ext uri="{909E8E84-426E-40dd-AFC4-6F175D3DCCD1}">
-                <a14:hiddenFill xmlns="" xmlns:a14="http://schemas.microsoft.com/office/drawing/2010/main">
+                <a14:hiddenFill xmlns:a14="http://schemas.microsoft.com/office/drawing/2010/main" xmlns="">
                   <a:noFill/>
                 </a14:hiddenFill>
               </a:ext>
               <a:ext uri="{AF507438-7753-43e0-B8FC-AC1667EBCBE1}">
-                <a14:hiddenEffects xmlns="" xmlns:a14="http://schemas.microsoft.com/office/drawing/2010/main">
+                <a14:hiddenEffects xmlns:a14="http://schemas.microsoft.com/office/drawing/2010/main" xmlns="">
                   <a:effectLst>
                     <a:outerShdw blurRad="63500" dist="38099" dir="2700000" algn="ctr" rotWithShape="0">
                       <a:srgbClr val="000000">
@@ -12488,7 +12521,7 @@
             <a:effectLst/>
             <a:extLst>
               <a:ext uri="{91240B29-F687-4f45-9708-019B960494DF}">
-                <a14:hiddenLine xmlns="" xmlns:a14="http://schemas.microsoft.com/office/drawing/2010/main" w="9525">
+                <a14:hiddenLine xmlns:a14="http://schemas.microsoft.com/office/drawing/2010/main" xmlns="" w="9525">
                   <a:solidFill>
                     <a:srgbClr val="C0C0C0"/>
                   </a:solidFill>
@@ -12498,7 +12531,7 @@
                 </a14:hiddenLine>
               </a:ext>
               <a:ext uri="{AF507438-7753-43e0-B8FC-AC1667EBCBE1}">
-                <a14:hiddenEffects xmlns="" xmlns:a14="http://schemas.microsoft.com/office/drawing/2010/main">
+                <a14:hiddenEffects xmlns:a14="http://schemas.microsoft.com/office/drawing/2010/main" xmlns="">
                   <a:effectLst>
                     <a:outerShdw blurRad="63500" dist="38099" dir="2700000" algn="ctr" rotWithShape="0">
                       <a:srgbClr val="000000">
@@ -12661,12 +12694,12 @@
             <a:effectLst/>
             <a:extLst>
               <a:ext uri="{909E8E84-426E-40dd-AFC4-6F175D3DCCD1}">
-                <a14:hiddenFill xmlns="" xmlns:a14="http://schemas.microsoft.com/office/drawing/2010/main">
+                <a14:hiddenFill xmlns:a14="http://schemas.microsoft.com/office/drawing/2010/main" xmlns="">
                   <a:noFill/>
                 </a14:hiddenFill>
               </a:ext>
               <a:ext uri="{AF507438-7753-43e0-B8FC-AC1667EBCBE1}">
-                <a14:hiddenEffects xmlns="" xmlns:a14="http://schemas.microsoft.com/office/drawing/2010/main">
+                <a14:hiddenEffects xmlns:a14="http://schemas.microsoft.com/office/drawing/2010/main" xmlns="">
                   <a:effectLst>
                     <a:outerShdw blurRad="63500" dist="38099" dir="2700000" algn="ctr" rotWithShape="0">
                       <a:srgbClr val="000000">
@@ -12711,7 +12744,7 @@
             <a:effectLst/>
             <a:extLst>
               <a:ext uri="{91240B29-F687-4f45-9708-019B960494DF}">
-                <a14:hiddenLine xmlns="" xmlns:a14="http://schemas.microsoft.com/office/drawing/2010/main" w="9525">
+                <a14:hiddenLine xmlns:a14="http://schemas.microsoft.com/office/drawing/2010/main" xmlns="" w="9525">
                   <a:solidFill>
                     <a:srgbClr val="C0C0C0"/>
                   </a:solidFill>
@@ -12721,7 +12754,7 @@
                 </a14:hiddenLine>
               </a:ext>
               <a:ext uri="{AF507438-7753-43e0-B8FC-AC1667EBCBE1}">
-                <a14:hiddenEffects xmlns="" xmlns:a14="http://schemas.microsoft.com/office/drawing/2010/main">
+                <a14:hiddenEffects xmlns:a14="http://schemas.microsoft.com/office/drawing/2010/main" xmlns="">
                   <a:effectLst>
                     <a:outerShdw blurRad="63500" dist="38099" dir="2700000" algn="ctr" rotWithShape="0">
                       <a:srgbClr val="000000">
@@ -12899,12 +12932,12 @@
             <a:effectLst/>
             <a:extLst>
               <a:ext uri="{909E8E84-426E-40dd-AFC4-6F175D3DCCD1}">
-                <a14:hiddenFill xmlns="" xmlns:a14="http://schemas.microsoft.com/office/drawing/2010/main">
+                <a14:hiddenFill xmlns:a14="http://schemas.microsoft.com/office/drawing/2010/main" xmlns="">
                   <a:noFill/>
                 </a14:hiddenFill>
               </a:ext>
               <a:ext uri="{AF507438-7753-43e0-B8FC-AC1667EBCBE1}">
-                <a14:hiddenEffects xmlns="" xmlns:a14="http://schemas.microsoft.com/office/drawing/2010/main">
+                <a14:hiddenEffects xmlns:a14="http://schemas.microsoft.com/office/drawing/2010/main" xmlns="">
                   <a:effectLst>
                     <a:outerShdw blurRad="63500" dist="38099" dir="2700000" algn="ctr" rotWithShape="0">
                       <a:srgbClr val="000000">
@@ -12955,12 +12988,12 @@
             <a:effectLst/>
             <a:extLst>
               <a:ext uri="{909E8E84-426E-40dd-AFC4-6F175D3DCCD1}">
-                <a14:hiddenFill xmlns="" xmlns:a14="http://schemas.microsoft.com/office/drawing/2010/main">
+                <a14:hiddenFill xmlns:a14="http://schemas.microsoft.com/office/drawing/2010/main" xmlns="">
                   <a:noFill/>
                 </a14:hiddenFill>
               </a:ext>
               <a:ext uri="{AF507438-7753-43e0-B8FC-AC1667EBCBE1}">
-                <a14:hiddenEffects xmlns="" xmlns:a14="http://schemas.microsoft.com/office/drawing/2010/main">
+                <a14:hiddenEffects xmlns:a14="http://schemas.microsoft.com/office/drawing/2010/main" xmlns="">
                   <a:effectLst>
                     <a:outerShdw blurRad="63500" dist="38099" dir="2700000" algn="ctr" rotWithShape="0">
                       <a:srgbClr val="000000">
@@ -13005,7 +13038,7 @@
             <a:effectLst/>
             <a:extLst>
               <a:ext uri="{91240B29-F687-4f45-9708-019B960494DF}">
-                <a14:hiddenLine xmlns="" xmlns:a14="http://schemas.microsoft.com/office/drawing/2010/main" w="9525">
+                <a14:hiddenLine xmlns:a14="http://schemas.microsoft.com/office/drawing/2010/main" xmlns="" w="9525">
                   <a:solidFill>
                     <a:srgbClr val="C0C0C0"/>
                   </a:solidFill>
@@ -13015,7 +13048,7 @@
                 </a14:hiddenLine>
               </a:ext>
               <a:ext uri="{AF507438-7753-43e0-B8FC-AC1667EBCBE1}">
-                <a14:hiddenEffects xmlns="" xmlns:a14="http://schemas.microsoft.com/office/drawing/2010/main">
+                <a14:hiddenEffects xmlns:a14="http://schemas.microsoft.com/office/drawing/2010/main" xmlns="">
                   <a:effectLst>
                     <a:outerShdw blurRad="63500" dist="38099" dir="2700000" algn="ctr" rotWithShape="0">
                       <a:srgbClr val="000000">
@@ -13187,12 +13220,12 @@
             <a:effectLst/>
             <a:extLst>
               <a:ext uri="{909E8E84-426E-40dd-AFC4-6F175D3DCCD1}">
-                <a14:hiddenFill xmlns="" xmlns:a14="http://schemas.microsoft.com/office/drawing/2010/main">
+                <a14:hiddenFill xmlns:a14="http://schemas.microsoft.com/office/drawing/2010/main" xmlns="">
                   <a:noFill/>
                 </a14:hiddenFill>
               </a:ext>
               <a:ext uri="{AF507438-7753-43e0-B8FC-AC1667EBCBE1}">
-                <a14:hiddenEffects xmlns="" xmlns:a14="http://schemas.microsoft.com/office/drawing/2010/main">
+                <a14:hiddenEffects xmlns:a14="http://schemas.microsoft.com/office/drawing/2010/main" xmlns="">
                   <a:effectLst>
                     <a:outerShdw blurRad="63500" dist="38099" dir="2700000" algn="ctr" rotWithShape="0">
                       <a:srgbClr val="000000">
@@ -13237,7 +13270,7 @@
             <a:effectLst/>
             <a:extLst>
               <a:ext uri="{91240B29-F687-4f45-9708-019B960494DF}">
-                <a14:hiddenLine xmlns="" xmlns:a14="http://schemas.microsoft.com/office/drawing/2010/main" w="9525">
+                <a14:hiddenLine xmlns:a14="http://schemas.microsoft.com/office/drawing/2010/main" xmlns="" w="9525">
                   <a:solidFill>
                     <a:srgbClr val="C0C0C0"/>
                   </a:solidFill>
@@ -13247,7 +13280,7 @@
                 </a14:hiddenLine>
               </a:ext>
               <a:ext uri="{AF507438-7753-43e0-B8FC-AC1667EBCBE1}">
-                <a14:hiddenEffects xmlns="" xmlns:a14="http://schemas.microsoft.com/office/drawing/2010/main">
+                <a14:hiddenEffects xmlns:a14="http://schemas.microsoft.com/office/drawing/2010/main" xmlns="">
                   <a:effectLst>
                     <a:outerShdw blurRad="63500" dist="38099" dir="2700000" algn="ctr" rotWithShape="0">
                       <a:srgbClr val="000000">
@@ -13410,12 +13443,12 @@
             <a:effectLst/>
             <a:extLst>
               <a:ext uri="{909E8E84-426E-40dd-AFC4-6F175D3DCCD1}">
-                <a14:hiddenFill xmlns="" xmlns:a14="http://schemas.microsoft.com/office/drawing/2010/main">
+                <a14:hiddenFill xmlns:a14="http://schemas.microsoft.com/office/drawing/2010/main" xmlns="">
                   <a:noFill/>
                 </a14:hiddenFill>
               </a:ext>
               <a:ext uri="{AF507438-7753-43e0-B8FC-AC1667EBCBE1}">
-                <a14:hiddenEffects xmlns="" xmlns:a14="http://schemas.microsoft.com/office/drawing/2010/main">
+                <a14:hiddenEffects xmlns:a14="http://schemas.microsoft.com/office/drawing/2010/main" xmlns="">
                   <a:effectLst>
                     <a:outerShdw blurRad="63500" dist="38099" dir="2700000" algn="ctr" rotWithShape="0">
                       <a:srgbClr val="000000">
@@ -13460,7 +13493,7 @@
             <a:effectLst/>
             <a:extLst>
               <a:ext uri="{91240B29-F687-4f45-9708-019B960494DF}">
-                <a14:hiddenLine xmlns="" xmlns:a14="http://schemas.microsoft.com/office/drawing/2010/main" w="9525">
+                <a14:hiddenLine xmlns:a14="http://schemas.microsoft.com/office/drawing/2010/main" xmlns="" w="9525">
                   <a:solidFill>
                     <a:srgbClr val="C0C0C0"/>
                   </a:solidFill>
@@ -13470,7 +13503,7 @@
                 </a14:hiddenLine>
               </a:ext>
               <a:ext uri="{AF507438-7753-43e0-B8FC-AC1667EBCBE1}">
-                <a14:hiddenEffects xmlns="" xmlns:a14="http://schemas.microsoft.com/office/drawing/2010/main">
+                <a14:hiddenEffects xmlns:a14="http://schemas.microsoft.com/office/drawing/2010/main" xmlns="">
                   <a:effectLst>
                     <a:outerShdw blurRad="63500" dist="38099" dir="2700000" algn="ctr" rotWithShape="0">
                       <a:srgbClr val="000000">
@@ -13660,12 +13693,12 @@
             <a:effectLst/>
             <a:extLst>
               <a:ext uri="{909E8E84-426E-40dd-AFC4-6F175D3DCCD1}">
-                <a14:hiddenFill xmlns="" xmlns:a14="http://schemas.microsoft.com/office/drawing/2010/main">
+                <a14:hiddenFill xmlns:a14="http://schemas.microsoft.com/office/drawing/2010/main" xmlns="">
                   <a:noFill/>
                 </a14:hiddenFill>
               </a:ext>
               <a:ext uri="{AF507438-7753-43e0-B8FC-AC1667EBCBE1}">
-                <a14:hiddenEffects xmlns="" xmlns:a14="http://schemas.microsoft.com/office/drawing/2010/main">
+                <a14:hiddenEffects xmlns:a14="http://schemas.microsoft.com/office/drawing/2010/main" xmlns="">
                   <a:effectLst>
                     <a:outerShdw blurRad="63500" dist="38099" dir="2700000" algn="ctr" rotWithShape="0">
                       <a:srgbClr val="000000">
@@ -13710,7 +13743,7 @@
             <a:effectLst/>
             <a:extLst>
               <a:ext uri="{91240B29-F687-4f45-9708-019B960494DF}">
-                <a14:hiddenLine xmlns="" xmlns:a14="http://schemas.microsoft.com/office/drawing/2010/main" w="9525">
+                <a14:hiddenLine xmlns:a14="http://schemas.microsoft.com/office/drawing/2010/main" xmlns="" w="9525">
                   <a:solidFill>
                     <a:srgbClr val="C0C0C0"/>
                   </a:solidFill>
@@ -13720,7 +13753,7 @@
                 </a14:hiddenLine>
               </a:ext>
               <a:ext uri="{AF507438-7753-43e0-B8FC-AC1667EBCBE1}">
-                <a14:hiddenEffects xmlns="" xmlns:a14="http://schemas.microsoft.com/office/drawing/2010/main">
+                <a14:hiddenEffects xmlns:a14="http://schemas.microsoft.com/office/drawing/2010/main" xmlns="">
                   <a:effectLst>
                     <a:outerShdw blurRad="63500" dist="38099" dir="2700000" algn="ctr" rotWithShape="0">
                       <a:srgbClr val="000000">
@@ -13892,12 +13925,12 @@
             <a:effectLst/>
             <a:extLst>
               <a:ext uri="{909E8E84-426E-40dd-AFC4-6F175D3DCCD1}">
-                <a14:hiddenFill xmlns="" xmlns:a14="http://schemas.microsoft.com/office/drawing/2010/main">
+                <a14:hiddenFill xmlns:a14="http://schemas.microsoft.com/office/drawing/2010/main" xmlns="">
                   <a:noFill/>
                 </a14:hiddenFill>
               </a:ext>
               <a:ext uri="{AF507438-7753-43e0-B8FC-AC1667EBCBE1}">
-                <a14:hiddenEffects xmlns="" xmlns:a14="http://schemas.microsoft.com/office/drawing/2010/main">
+                <a14:hiddenEffects xmlns:a14="http://schemas.microsoft.com/office/drawing/2010/main" xmlns="">
                   <a:effectLst>
                     <a:outerShdw blurRad="63500" dist="38099" dir="2700000" algn="ctr" rotWithShape="0">
                       <a:srgbClr val="000000">
@@ -13942,7 +13975,7 @@
             <a:effectLst/>
             <a:extLst>
               <a:ext uri="{91240B29-F687-4f45-9708-019B960494DF}">
-                <a14:hiddenLine xmlns="" xmlns:a14="http://schemas.microsoft.com/office/drawing/2010/main" w="9525">
+                <a14:hiddenLine xmlns:a14="http://schemas.microsoft.com/office/drawing/2010/main" xmlns="" w="9525">
                   <a:solidFill>
                     <a:srgbClr val="C0C0C0"/>
                   </a:solidFill>
@@ -13952,7 +13985,7 @@
                 </a14:hiddenLine>
               </a:ext>
               <a:ext uri="{AF507438-7753-43e0-B8FC-AC1667EBCBE1}">
-                <a14:hiddenEffects xmlns="" xmlns:a14="http://schemas.microsoft.com/office/drawing/2010/main">
+                <a14:hiddenEffects xmlns:a14="http://schemas.microsoft.com/office/drawing/2010/main" xmlns="">
                   <a:effectLst>
                     <a:outerShdw blurRad="63500" dist="38099" dir="2700000" algn="ctr" rotWithShape="0">
                       <a:srgbClr val="000000">
@@ -14129,14 +14162,14 @@
           <a:effectLst/>
           <a:extLst>
             <a:ext uri="{909E8E84-426E-40dd-AFC4-6F175D3DCCD1}">
-              <a14:hiddenFill xmlns="" xmlns:a14="http://schemas.microsoft.com/office/drawing/2010/main">
+              <a14:hiddenFill xmlns:a14="http://schemas.microsoft.com/office/drawing/2010/main" xmlns="">
                 <a:solidFill>
                   <a:schemeClr val="accent1"/>
                 </a:solidFill>
               </a14:hiddenFill>
             </a:ext>
             <a:ext uri="{91240B29-F687-4f45-9708-019B960494DF}">
-              <a14:hiddenLine xmlns="" xmlns:a14="http://schemas.microsoft.com/office/drawing/2010/main" w="9525">
+              <a14:hiddenLine xmlns:a14="http://schemas.microsoft.com/office/drawing/2010/main" xmlns="" w="9525">
                 <a:solidFill>
                   <a:schemeClr val="tx1"/>
                 </a:solidFill>
@@ -14146,7 +14179,7 @@
               </a14:hiddenLine>
             </a:ext>
             <a:ext uri="{AF507438-7753-43e0-B8FC-AC1667EBCBE1}">
-              <a14:hiddenEffects xmlns="" xmlns:a14="http://schemas.microsoft.com/office/drawing/2010/main">
+              <a14:hiddenEffects xmlns:a14="http://schemas.microsoft.com/office/drawing/2010/main" xmlns="">
                 <a:effectLst>
                   <a:outerShdw blurRad="63500" dist="38099" dir="2700000" algn="ctr" rotWithShape="0">
                     <a:schemeClr val="bg2">
@@ -15431,7 +15464,7 @@
           </a:effectLst>
           <a:extLst>
             <a:ext uri="{91240B29-F687-4f45-9708-019B960494DF}">
-              <a14:hiddenLine xmlns:a16="http://schemas.microsoft.com/office/drawing/2014/main" xmlns:p14="http://schemas.microsoft.com/office/powerpoint/2010/main" xmlns:a14="http://schemas.microsoft.com/office/drawing/2010/main" xmlns="" w="9525">
+              <a14:hiddenLine xmlns="" xmlns:a14="http://schemas.microsoft.com/office/drawing/2010/main" xmlns:p14="http://schemas.microsoft.com/office/powerpoint/2010/main" xmlns:a16="http://schemas.microsoft.com/office/drawing/2014/main" w="9525">
                 <a:solidFill>
                   <a:srgbClr val="000000"/>
                 </a:solidFill>
@@ -19656,7 +19689,7 @@
           <a:noFill/>
           <a:extLst>
             <a:ext uri="{91240B29-F687-4f45-9708-019B960494DF}">
-              <a14:hiddenLine xmlns="" xmlns:a14="http://schemas.microsoft.com/office/drawing/2010/main" w="12700">
+              <a14:hiddenLine xmlns:a14="http://schemas.microsoft.com/office/drawing/2010/main" xmlns="" w="12700">
                 <a:solidFill>
                   <a:schemeClr val="tx1"/>
                 </a:solidFill>
@@ -19716,7 +19749,7 @@
           </a:effectLst>
           <a:extLst>
             <a:ext uri="{91240B29-F687-4f45-9708-019B960494DF}">
-              <a14:hiddenLine xmlns="" xmlns:a14="http://schemas.microsoft.com/office/drawing/2010/main" w="12700">
+              <a14:hiddenLine xmlns:a14="http://schemas.microsoft.com/office/drawing/2010/main" xmlns="" w="12700">
                 <a:solidFill>
                   <a:schemeClr val="tx1"/>
                 </a:solidFill>
@@ -19788,7 +19821,7 @@
             </a:effectLst>
             <a:extLst>
               <a:ext uri="{91240B29-F687-4f45-9708-019B960494DF}">
-                <a14:hiddenLine xmlns="" xmlns:a14="http://schemas.microsoft.com/office/drawing/2010/main" w="12700">
+                <a14:hiddenLine xmlns:a14="http://schemas.microsoft.com/office/drawing/2010/main" xmlns="" w="12700">
                   <a:solidFill>
                     <a:schemeClr val="tx1"/>
                   </a:solidFill>
@@ -19847,7 +19880,7 @@
             </a:effectLst>
             <a:extLst>
               <a:ext uri="{91240B29-F687-4f45-9708-019B960494DF}">
-                <a14:hiddenLine xmlns="" xmlns:a14="http://schemas.microsoft.com/office/drawing/2010/main" w="12700">
+                <a14:hiddenLine xmlns:a14="http://schemas.microsoft.com/office/drawing/2010/main" xmlns="" w="12700">
                   <a:solidFill>
                     <a:schemeClr val="tx1"/>
                   </a:solidFill>
@@ -19915,7 +19948,7 @@
             </a:effectLst>
             <a:extLst>
               <a:ext uri="{91240B29-F687-4f45-9708-019B960494DF}">
-                <a14:hiddenLine xmlns="" xmlns:a14="http://schemas.microsoft.com/office/drawing/2010/main" w="12700">
+                <a14:hiddenLine xmlns:a14="http://schemas.microsoft.com/office/drawing/2010/main" xmlns="" w="12700">
                   <a:solidFill>
                     <a:schemeClr val="tx1"/>
                   </a:solidFill>
@@ -19963,7 +19996,7 @@
             </a:effectLst>
             <a:extLst>
               <a:ext uri="{91240B29-F687-4f45-9708-019B960494DF}">
-                <a14:hiddenLine xmlns="" xmlns:a14="http://schemas.microsoft.com/office/drawing/2010/main" w="12700">
+                <a14:hiddenLine xmlns:a14="http://schemas.microsoft.com/office/drawing/2010/main" xmlns="" w="12700">
                   <a:solidFill>
                     <a:schemeClr val="tx1"/>
                   </a:solidFill>
@@ -20031,7 +20064,7 @@
           </a:effectLst>
           <a:extLst>
             <a:ext uri="{91240B29-F687-4f45-9708-019B960494DF}">
-              <a14:hiddenLine xmlns="" xmlns:a14="http://schemas.microsoft.com/office/drawing/2010/main" w="12700">
+              <a14:hiddenLine xmlns:a14="http://schemas.microsoft.com/office/drawing/2010/main" xmlns="" w="12700">
                 <a:solidFill>
                   <a:schemeClr val="tx1"/>
                 </a:solidFill>
@@ -20106,7 +20139,7 @@
             </a:effectLst>
             <a:extLst>
               <a:ext uri="{91240B29-F687-4f45-9708-019B960494DF}">
-                <a14:hiddenLine xmlns="" xmlns:a14="http://schemas.microsoft.com/office/drawing/2010/main" w="12700">
+                <a14:hiddenLine xmlns:a14="http://schemas.microsoft.com/office/drawing/2010/main" xmlns="" w="12700">
                   <a:solidFill>
                     <a:schemeClr val="tx1"/>
                   </a:solidFill>
@@ -20154,7 +20187,7 @@
             </a:effectLst>
             <a:extLst>
               <a:ext uri="{91240B29-F687-4f45-9708-019B960494DF}">
-                <a14:hiddenLine xmlns="" xmlns:a14="http://schemas.microsoft.com/office/drawing/2010/main" w="12700">
+                <a14:hiddenLine xmlns:a14="http://schemas.microsoft.com/office/drawing/2010/main" xmlns="" w="12700">
                   <a:solidFill>
                     <a:schemeClr val="tx1"/>
                   </a:solidFill>
@@ -20227,7 +20260,7 @@
             </a:effectLst>
             <a:extLst>
               <a:ext uri="{91240B29-F687-4f45-9708-019B960494DF}">
-                <a14:hiddenLine xmlns="" xmlns:a14="http://schemas.microsoft.com/office/drawing/2010/main" w="12700">
+                <a14:hiddenLine xmlns:a14="http://schemas.microsoft.com/office/drawing/2010/main" xmlns="" w="12700">
                   <a:solidFill>
                     <a:schemeClr val="tx1"/>
                   </a:solidFill>
@@ -20297,7 +20330,7 @@
             </a:effectLst>
             <a:extLst>
               <a:ext uri="{91240B29-F687-4f45-9708-019B960494DF}">
-                <a14:hiddenLine xmlns="" xmlns:a14="http://schemas.microsoft.com/office/drawing/2010/main" w="12700">
+                <a14:hiddenLine xmlns:a14="http://schemas.microsoft.com/office/drawing/2010/main" xmlns="" w="12700">
                   <a:solidFill>
                     <a:schemeClr val="tx1"/>
                   </a:solidFill>
@@ -20965,7 +20998,7 @@
           </a:effectLst>
           <a:extLst>
             <a:ext uri="{91240B29-F687-4f45-9708-019B960494DF}">
-              <a14:hiddenLine xmlns="" xmlns:a14="http://schemas.microsoft.com/office/drawing/2010/main" xmlns:p14="http://schemas.microsoft.com/office/powerpoint/2010/main" xmlns:a16="http://schemas.microsoft.com/office/drawing/2014/main" w="9525">
+              <a14:hiddenLine xmlns:a16="http://schemas.microsoft.com/office/drawing/2014/main" xmlns:p14="http://schemas.microsoft.com/office/powerpoint/2010/main" xmlns:a14="http://schemas.microsoft.com/office/drawing/2010/main" xmlns="" w="9525">
                 <a:solidFill>
                   <a:srgbClr val="000000"/>
                 </a:solidFill>

</xml_diff>